<commit_message>
Week 5 Final Report
</commit_message>
<xml_diff>
--- a/Week5 - Final Report.pptx
+++ b/Week5 - Final Report.pptx
@@ -9,6 +9,7 @@
     <p:sldId id="257" r:id="rId3"/>
     <p:sldId id="258" r:id="rId4"/>
     <p:sldId id="259" r:id="rId5"/>
+    <p:sldId id="260" r:id="rId6"/>
   </p:sldIdLst>
   <p:sldSz cx="6858000" cy="12192000"/>
   <p:notesSz cx="6858000" cy="9144000"/>
@@ -5643,7 +5644,7 @@
         <p:spPr>
           <a:xfrm>
             <a:off x="259080" y="457200"/>
-            <a:ext cx="6400800" cy="6340197"/>
+            <a:ext cx="6400800" cy="4124206"/>
           </a:xfrm>
           <a:prstGeom prst="rect">
             <a:avLst/>
@@ -5846,134 +5847,6 @@
               <a:latin typeface="Arial" panose="020B0604020202020204" pitchFamily="34" charset="0"/>
               <a:cs typeface="Arial" panose="020B0604020202020204" pitchFamily="34" charset="0"/>
             </a:endParaRPr>
-          </a:p>
-          <a:p>
-            <a:r>
-              <a:rPr lang="en-US" sz="1400" b="1" i="1" dirty="0">
-                <a:solidFill>
-                  <a:schemeClr val="bg1"/>
-                </a:solidFill>
-                <a:latin typeface="Arial" panose="020B0604020202020204" pitchFamily="34" charset="0"/>
-                <a:cs typeface="Arial" panose="020B0604020202020204" pitchFamily="34" charset="0"/>
-              </a:rPr>
-              <a:t>Data and Methodology</a:t>
-            </a:r>
-          </a:p>
-          <a:p>
-            <a:r>
-              <a:rPr lang="en-US" sz="1000" dirty="0">
-                <a:solidFill>
-                  <a:schemeClr val="bg1"/>
-                </a:solidFill>
-                <a:latin typeface="Arial" panose="020B0604020202020204" pitchFamily="34" charset="0"/>
-                <a:cs typeface="Arial" panose="020B0604020202020204" pitchFamily="34" charset="0"/>
-              </a:rPr>
-              <a:t>Data Cleaning: The data cleaning process for each of the sources of data are done separately.  The focus will be entirely on Travis and Williamson counties within the state of Texas.</a:t>
-            </a:r>
-          </a:p>
-          <a:p>
-            <a:endParaRPr lang="en-US" sz="1000" dirty="0">
-              <a:solidFill>
-                <a:schemeClr val="bg1"/>
-              </a:solidFill>
-              <a:latin typeface="Arial" panose="020B0604020202020204" pitchFamily="34" charset="0"/>
-              <a:cs typeface="Arial" panose="020B0604020202020204" pitchFamily="34" charset="0"/>
-            </a:endParaRPr>
-          </a:p>
-          <a:p>
-            <a:r>
-              <a:rPr lang="en-US" sz="1000" dirty="0">
-                <a:solidFill>
-                  <a:schemeClr val="bg1"/>
-                </a:solidFill>
-                <a:latin typeface="Arial" panose="020B0604020202020204" pitchFamily="34" charset="0"/>
-                <a:cs typeface="Arial" panose="020B0604020202020204" pitchFamily="34" charset="0"/>
-              </a:rPr>
-              <a:t>Data will be pulled from </a:t>
-            </a:r>
-            <a:r>
-              <a:rPr lang="en-US" sz="1000" dirty="0">
-                <a:solidFill>
-                  <a:schemeClr val="bg1"/>
-                </a:solidFill>
-                <a:latin typeface="Arial" panose="020B0604020202020204" pitchFamily="34" charset="0"/>
-                <a:cs typeface="Arial" panose="020B0604020202020204" pitchFamily="34" charset="0"/>
-                <a:hlinkClick r:id="rId2"/>
-              </a:rPr>
-              <a:t>https://www.zip-codes.com</a:t>
-            </a:r>
-            <a:r>
-              <a:rPr lang="en-US" sz="1000" dirty="0">
-                <a:solidFill>
-                  <a:schemeClr val="bg1"/>
-                </a:solidFill>
-                <a:latin typeface="Arial" panose="020B0604020202020204" pitchFamily="34" charset="0"/>
-                <a:cs typeface="Arial" panose="020B0604020202020204" pitchFamily="34" charset="0"/>
-              </a:rPr>
-              <a:t> to determine the major cities and their corresponding population within Travis and Williamson counties.  That data will be the population influence part of the problem. After visualizing the location of each city, we can correlate the population data.</a:t>
-            </a:r>
-          </a:p>
-          <a:p>
-            <a:endParaRPr lang="en-US" sz="1000" dirty="0">
-              <a:solidFill>
-                <a:schemeClr val="bg1"/>
-              </a:solidFill>
-              <a:latin typeface="Arial" panose="020B0604020202020204" pitchFamily="34" charset="0"/>
-              <a:cs typeface="Arial" panose="020B0604020202020204" pitchFamily="34" charset="0"/>
-            </a:endParaRPr>
-          </a:p>
-          <a:p>
-            <a:r>
-              <a:rPr lang="en-US" sz="1000" dirty="0">
-                <a:solidFill>
-                  <a:schemeClr val="bg1"/>
-                </a:solidFill>
-                <a:latin typeface="Arial" panose="020B0604020202020204" pitchFamily="34" charset="0"/>
-                <a:cs typeface="Arial" panose="020B0604020202020204" pitchFamily="34" charset="0"/>
-              </a:rPr>
-              <a:t>Foursquare will be used to pull in the location of all pet stores located within a 25 mile radius of each of the major cities identified.</a:t>
-            </a:r>
-          </a:p>
-          <a:p>
-            <a:endParaRPr lang="en-US" sz="1000" dirty="0">
-              <a:solidFill>
-                <a:schemeClr val="bg1"/>
-              </a:solidFill>
-              <a:latin typeface="Arial" panose="020B0604020202020204" pitchFamily="34" charset="0"/>
-              <a:cs typeface="Arial" panose="020B0604020202020204" pitchFamily="34" charset="0"/>
-            </a:endParaRPr>
-          </a:p>
-          <a:p>
-            <a:r>
-              <a:rPr lang="en-US" sz="1000" dirty="0">
-                <a:solidFill>
-                  <a:schemeClr val="bg1"/>
-                </a:solidFill>
-                <a:latin typeface="Arial" panose="020B0604020202020204" pitchFamily="34" charset="0"/>
-                <a:cs typeface="Arial" panose="020B0604020202020204" pitchFamily="34" charset="0"/>
-              </a:rPr>
-              <a:t>The methodology will be </a:t>
-            </a:r>
-            <a:r>
-              <a:rPr lang="en-US" sz="1000" dirty="0" err="1">
-                <a:solidFill>
-                  <a:schemeClr val="bg1"/>
-                </a:solidFill>
-                <a:latin typeface="Arial" panose="020B0604020202020204" pitchFamily="34" charset="0"/>
-                <a:cs typeface="Arial" panose="020B0604020202020204" pitchFamily="34" charset="0"/>
-              </a:rPr>
-              <a:t>Knn</a:t>
-            </a:r>
-            <a:r>
-              <a:rPr lang="en-US" sz="1000" dirty="0">
-                <a:solidFill>
-                  <a:schemeClr val="bg1"/>
-                </a:solidFill>
-                <a:latin typeface="Arial" panose="020B0604020202020204" pitchFamily="34" charset="0"/>
-                <a:cs typeface="Arial" panose="020B0604020202020204" pitchFamily="34" charset="0"/>
-              </a:rPr>
-              <a:t> processing to produce the ideal cluster grouping to best represent the locations of the existing pet stores, and then correlate that back to the population data.  This will help identify the best city location for a new pet store.</a:t>
-            </a:r>
           </a:p>
         </p:txBody>
       </p:sp>
@@ -6055,7 +5928,7 @@
                 <a:latin typeface="Arial" panose="020B0604020202020204" pitchFamily="34" charset="0"/>
                 <a:cs typeface="Arial" panose="020B0604020202020204" pitchFamily="34" charset="0"/>
               </a:rPr>
-              <a:t>Data Analysis</a:t>
+              <a:t>Data</a:t>
             </a:r>
           </a:p>
           <a:p>
@@ -6458,7 +6331,7 @@
         </p:blipFill>
         <p:spPr>
           <a:xfrm>
-            <a:off x="2801420" y="2335732"/>
+            <a:off x="2771055" y="2335732"/>
             <a:ext cx="3749493" cy="3530913"/>
           </a:xfrm>
           <a:prstGeom prst="rect">
@@ -6488,7 +6361,7 @@
         </p:blipFill>
         <p:spPr>
           <a:xfrm>
-            <a:off x="350249" y="6651895"/>
+            <a:off x="319884" y="6498007"/>
             <a:ext cx="6200664" cy="4643609"/>
           </a:xfrm>
           <a:prstGeom prst="rect">
@@ -6549,7 +6422,7 @@
         <p:spPr>
           <a:xfrm>
             <a:off x="259080" y="457200"/>
-            <a:ext cx="6400800" cy="10864513"/>
+            <a:ext cx="6400800" cy="11233845"/>
           </a:xfrm>
           <a:prstGeom prst="rect">
             <a:avLst/>
@@ -6564,6 +6437,151 @@
           <a:p>
             <a:pPr marL="400050" indent="-400050">
               <a:buFont typeface="+mj-lt"/>
+              <a:buAutoNum type="romanUcPeriod" startAt="2"/>
+            </a:pPr>
+            <a:r>
+              <a:rPr lang="en-US" sz="1600" b="1" dirty="0">
+                <a:solidFill>
+                  <a:schemeClr val="bg1"/>
+                </a:solidFill>
+                <a:latin typeface="Arial" panose="020B0604020202020204" pitchFamily="34" charset="0"/>
+                <a:cs typeface="Arial" panose="020B0604020202020204" pitchFamily="34" charset="0"/>
+              </a:rPr>
+              <a:t>Methodology</a:t>
+            </a:r>
+          </a:p>
+          <a:p>
+            <a:r>
+              <a:rPr lang="en-US" sz="1000" dirty="0">
+                <a:solidFill>
+                  <a:schemeClr val="bg1"/>
+                </a:solidFill>
+                <a:latin typeface="Arial" panose="020B0604020202020204" pitchFamily="34" charset="0"/>
+                <a:cs typeface="Arial" panose="020B0604020202020204" pitchFamily="34" charset="0"/>
+              </a:rPr>
+              <a:t>Data Cleaning: The data cleaning process for each of the sources of data are done separately.  The focus will be entirely on Travis and Williamson counties within the state of Texas.</a:t>
+            </a:r>
+          </a:p>
+          <a:p>
+            <a:endParaRPr lang="en-US" sz="1000" dirty="0">
+              <a:solidFill>
+                <a:schemeClr val="bg1"/>
+              </a:solidFill>
+              <a:latin typeface="Arial" panose="020B0604020202020204" pitchFamily="34" charset="0"/>
+              <a:cs typeface="Arial" panose="020B0604020202020204" pitchFamily="34" charset="0"/>
+            </a:endParaRPr>
+          </a:p>
+          <a:p>
+            <a:r>
+              <a:rPr lang="en-US" sz="1000" dirty="0">
+                <a:solidFill>
+                  <a:schemeClr val="bg1"/>
+                </a:solidFill>
+                <a:latin typeface="Arial" panose="020B0604020202020204" pitchFamily="34" charset="0"/>
+                <a:cs typeface="Arial" panose="020B0604020202020204" pitchFamily="34" charset="0"/>
+              </a:rPr>
+              <a:t>Data will be pulled from </a:t>
+            </a:r>
+            <a:r>
+              <a:rPr lang="en-US" sz="1000" dirty="0">
+                <a:solidFill>
+                  <a:schemeClr val="bg1"/>
+                </a:solidFill>
+                <a:latin typeface="Arial" panose="020B0604020202020204" pitchFamily="34" charset="0"/>
+                <a:cs typeface="Arial" panose="020B0604020202020204" pitchFamily="34" charset="0"/>
+                <a:hlinkClick r:id="rId2"/>
+              </a:rPr>
+              <a:t>https://www.zip-codes.com</a:t>
+            </a:r>
+            <a:r>
+              <a:rPr lang="en-US" sz="1000" dirty="0">
+                <a:solidFill>
+                  <a:schemeClr val="bg1"/>
+                </a:solidFill>
+                <a:latin typeface="Arial" panose="020B0604020202020204" pitchFamily="34" charset="0"/>
+                <a:cs typeface="Arial" panose="020B0604020202020204" pitchFamily="34" charset="0"/>
+              </a:rPr>
+              <a:t> to determine the major cities and their corresponding population within Travis and Williamson counties.  That data will be the population influence part of the problem. After visualizing the location of each city, we can correlate the population data.</a:t>
+            </a:r>
+          </a:p>
+          <a:p>
+            <a:endParaRPr lang="en-US" sz="1000" dirty="0">
+              <a:solidFill>
+                <a:schemeClr val="bg1"/>
+              </a:solidFill>
+              <a:latin typeface="Arial" panose="020B0604020202020204" pitchFamily="34" charset="0"/>
+              <a:cs typeface="Arial" panose="020B0604020202020204" pitchFamily="34" charset="0"/>
+            </a:endParaRPr>
+          </a:p>
+          <a:p>
+            <a:r>
+              <a:rPr lang="en-US" sz="1000" dirty="0">
+                <a:solidFill>
+                  <a:schemeClr val="bg1"/>
+                </a:solidFill>
+                <a:latin typeface="Arial" panose="020B0604020202020204" pitchFamily="34" charset="0"/>
+                <a:cs typeface="Arial" panose="020B0604020202020204" pitchFamily="34" charset="0"/>
+              </a:rPr>
+              <a:t>Foursquare will be used to pull in the location of all pet stores located within a 25 mile radius of each of the major cities identified.</a:t>
+            </a:r>
+          </a:p>
+          <a:p>
+            <a:endParaRPr lang="en-US" sz="1000" dirty="0">
+              <a:solidFill>
+                <a:schemeClr val="bg1"/>
+              </a:solidFill>
+              <a:latin typeface="Arial" panose="020B0604020202020204" pitchFamily="34" charset="0"/>
+              <a:cs typeface="Arial" panose="020B0604020202020204" pitchFamily="34" charset="0"/>
+            </a:endParaRPr>
+          </a:p>
+          <a:p>
+            <a:r>
+              <a:rPr lang="en-US" sz="1000" dirty="0">
+                <a:solidFill>
+                  <a:schemeClr val="bg1"/>
+                </a:solidFill>
+                <a:latin typeface="Arial" panose="020B0604020202020204" pitchFamily="34" charset="0"/>
+                <a:cs typeface="Arial" panose="020B0604020202020204" pitchFamily="34" charset="0"/>
+              </a:rPr>
+              <a:t>The methodology will be </a:t>
+            </a:r>
+            <a:r>
+              <a:rPr lang="en-US" sz="1000" dirty="0" err="1">
+                <a:solidFill>
+                  <a:schemeClr val="bg1"/>
+                </a:solidFill>
+                <a:latin typeface="Arial" panose="020B0604020202020204" pitchFamily="34" charset="0"/>
+                <a:cs typeface="Arial" panose="020B0604020202020204" pitchFamily="34" charset="0"/>
+              </a:rPr>
+              <a:t>Knn</a:t>
+            </a:r>
+            <a:r>
+              <a:rPr lang="en-US" sz="1000" dirty="0">
+                <a:solidFill>
+                  <a:schemeClr val="bg1"/>
+                </a:solidFill>
+                <a:latin typeface="Arial" panose="020B0604020202020204" pitchFamily="34" charset="0"/>
+                <a:cs typeface="Arial" panose="020B0604020202020204" pitchFamily="34" charset="0"/>
+              </a:rPr>
+              <a:t> processing to produce the ideal cluster grouping to best represent the locations of the existing pet stores, and then correlate that back to the population data.  This will help identify the best city location for a new pet store.</a:t>
+            </a:r>
+          </a:p>
+          <a:p>
+            <a:pPr marL="400050" indent="-400050">
+              <a:buFont typeface="+mj-lt"/>
+              <a:buAutoNum type="romanUcPeriod" startAt="3"/>
+            </a:pPr>
+            <a:endParaRPr lang="en-US" sz="1600" b="1" dirty="0">
+              <a:solidFill>
+                <a:schemeClr val="bg1"/>
+              </a:solidFill>
+              <a:latin typeface="Arial" panose="020B0604020202020204" pitchFamily="34" charset="0"/>
+              <a:cs typeface="Arial" panose="020B0604020202020204" pitchFamily="34" charset="0"/>
+            </a:endParaRPr>
+          </a:p>
+          <a:p>
+            <a:pPr marL="400050" indent="-400050">
+              <a:buFont typeface="+mj-lt"/>
               <a:buAutoNum type="romanUcPeriod" startAt="3"/>
             </a:pPr>
             <a:r>
@@ -7052,111 +7070,6 @@
               <a:buFont typeface="Arial" panose="020B0604020202020204" pitchFamily="34" charset="0"/>
               <a:buChar char="•"/>
             </a:pPr>
-            <a:endParaRPr lang="en-US" sz="1000" dirty="0">
-              <a:solidFill>
-                <a:schemeClr val="bg1"/>
-              </a:solidFill>
-              <a:latin typeface="Arial" panose="020B0604020202020204" pitchFamily="34" charset="0"/>
-              <a:cs typeface="Arial" panose="020B0604020202020204" pitchFamily="34" charset="0"/>
-            </a:endParaRPr>
-          </a:p>
-          <a:p>
-            <a:pPr marL="171450" indent="-171450">
-              <a:buFont typeface="Arial" panose="020B0604020202020204" pitchFamily="34" charset="0"/>
-              <a:buChar char="•"/>
-            </a:pPr>
-            <a:endParaRPr lang="en-US" sz="1000" dirty="0">
-              <a:solidFill>
-                <a:schemeClr val="bg1"/>
-              </a:solidFill>
-              <a:latin typeface="Arial" panose="020B0604020202020204" pitchFamily="34" charset="0"/>
-              <a:cs typeface="Arial" panose="020B0604020202020204" pitchFamily="34" charset="0"/>
-            </a:endParaRPr>
-          </a:p>
-          <a:p>
-            <a:pPr marL="400050" indent="-400050">
-              <a:buFont typeface="+mj-lt"/>
-              <a:buAutoNum type="romanUcPeriod" startAt="5"/>
-            </a:pPr>
-            <a:r>
-              <a:rPr lang="en-US" sz="1600" b="1" dirty="0">
-                <a:solidFill>
-                  <a:schemeClr val="bg1"/>
-                </a:solidFill>
-                <a:latin typeface="Arial" panose="020B0604020202020204" pitchFamily="34" charset="0"/>
-                <a:cs typeface="Arial" panose="020B0604020202020204" pitchFamily="34" charset="0"/>
-              </a:rPr>
-              <a:t>Conclusion</a:t>
-            </a:r>
-          </a:p>
-          <a:p>
-            <a:r>
-              <a:rPr lang="en-US" sz="1000" dirty="0">
-                <a:solidFill>
-                  <a:schemeClr val="bg1"/>
-                </a:solidFill>
-                <a:latin typeface="Arial" panose="020B0604020202020204" pitchFamily="34" charset="0"/>
-                <a:cs typeface="Arial" panose="020B0604020202020204" pitchFamily="34" charset="0"/>
-              </a:rPr>
-              <a:t>Based on the mapping data and information provided, the best location to start a new Pet Supply store where there is not already a large number of stores would be in the Pflugerville area along the I-130 corridor to Manor.</a:t>
-            </a:r>
-          </a:p>
-          <a:p>
-            <a:endParaRPr lang="en-US" sz="1000" dirty="0">
-              <a:solidFill>
-                <a:schemeClr val="bg1"/>
-              </a:solidFill>
-              <a:latin typeface="Arial" panose="020B0604020202020204" pitchFamily="34" charset="0"/>
-              <a:cs typeface="Arial" panose="020B0604020202020204" pitchFamily="34" charset="0"/>
-            </a:endParaRPr>
-          </a:p>
-          <a:p>
-            <a:r>
-              <a:rPr lang="en-US" sz="1000" dirty="0">
-                <a:solidFill>
-                  <a:schemeClr val="bg1"/>
-                </a:solidFill>
-                <a:latin typeface="Arial" panose="020B0604020202020204" pitchFamily="34" charset="0"/>
-                <a:cs typeface="Arial" panose="020B0604020202020204" pitchFamily="34" charset="0"/>
-              </a:rPr>
-              <a:t>This is a first-order solution to the question “Where is the best place to open a new pet supply store near Austin, Texas?” Using public datasets, we are able to, at least partially, address a few factors we have mentioned at the beginning: population and existing saturation of pet stores. We also carry out a very simple competitor analysis based on the distribution of pet stores in the chosen Travis and Williamson counties.</a:t>
-            </a:r>
-          </a:p>
-          <a:p>
-            <a:endParaRPr lang="en-US" sz="1000" dirty="0">
-              <a:solidFill>
-                <a:schemeClr val="bg1"/>
-              </a:solidFill>
-              <a:latin typeface="Arial" panose="020B0604020202020204" pitchFamily="34" charset="0"/>
-              <a:cs typeface="Arial" panose="020B0604020202020204" pitchFamily="34" charset="0"/>
-            </a:endParaRPr>
-          </a:p>
-          <a:p>
-            <a:r>
-              <a:rPr lang="en-US" sz="1000" dirty="0">
-                <a:solidFill>
-                  <a:schemeClr val="bg1"/>
-                </a:solidFill>
-                <a:latin typeface="Arial" panose="020B0604020202020204" pitchFamily="34" charset="0"/>
-                <a:cs typeface="Arial" panose="020B0604020202020204" pitchFamily="34" charset="0"/>
-              </a:rPr>
-              <a:t>Further analysis would need to take into consideration cost of opening the store in the locations, along with ease of access to the business at those locations.</a:t>
-            </a:r>
-          </a:p>
-          <a:p>
-            <a:pPr marL="171450" indent="-171450">
-              <a:buFont typeface="Arial" panose="020B0604020202020204" pitchFamily="34" charset="0"/>
-              <a:buChar char="•"/>
-            </a:pPr>
-            <a:endParaRPr lang="en-US" sz="1000" dirty="0">
-              <a:solidFill>
-                <a:schemeClr val="bg1"/>
-              </a:solidFill>
-              <a:latin typeface="Arial" panose="020B0604020202020204" pitchFamily="34" charset="0"/>
-              <a:cs typeface="Arial" panose="020B0604020202020204" pitchFamily="34" charset="0"/>
-            </a:endParaRPr>
-          </a:p>
-          <a:p>
             <a:endParaRPr lang="en-US" sz="1000" dirty="0">
               <a:solidFill>
                 <a:schemeClr val="bg1"/>
@@ -7198,14 +7111,14 @@
           <p:nvPr/>
         </p:nvPicPr>
         <p:blipFill>
-          <a:blip r:embed="rId2"/>
+          <a:blip r:embed="rId3"/>
           <a:stretch>
             <a:fillRect/>
           </a:stretch>
         </p:blipFill>
         <p:spPr>
           <a:xfrm>
-            <a:off x="790976" y="1681526"/>
+            <a:off x="836696" y="4154216"/>
             <a:ext cx="4952599" cy="4489671"/>
           </a:xfrm>
           <a:prstGeom prst="rect">
@@ -7217,6 +7130,150 @@
     <p:extLst>
       <p:ext uri="{BB962C8B-B14F-4D97-AF65-F5344CB8AC3E}">
         <p14:creationId xmlns:p14="http://schemas.microsoft.com/office/powerpoint/2010/main" val="2995389901"/>
+      </p:ext>
+    </p:extLst>
+  </p:cSld>
+  <p:clrMapOvr>
+    <a:masterClrMapping/>
+  </p:clrMapOvr>
+</p:sld>
+</file>
+
+<file path=ppt/slides/slide5.xml><?xml version="1.0" encoding="utf-8"?>
+<p:sld xmlns:a="http://schemas.openxmlformats.org/drawingml/2006/main" xmlns:r="http://schemas.openxmlformats.org/officeDocument/2006/relationships" xmlns:p="http://schemas.openxmlformats.org/presentationml/2006/main">
+  <p:cSld>
+    <p:bg>
+      <p:bgPr>
+        <a:solidFill>
+          <a:schemeClr val="tx1"/>
+        </a:solidFill>
+        <a:effectLst/>
+      </p:bgPr>
+    </p:bg>
+    <p:spTree>
+      <p:nvGrpSpPr>
+        <p:cNvPr id="1" name=""/>
+        <p:cNvGrpSpPr/>
+        <p:nvPr/>
+      </p:nvGrpSpPr>
+      <p:grpSpPr>
+        <a:xfrm>
+          <a:off x="0" y="0"/>
+          <a:ext cx="0" cy="0"/>
+          <a:chOff x="0" y="0"/>
+          <a:chExt cx="0" cy="0"/>
+        </a:xfrm>
+      </p:grpSpPr>
+      <p:sp>
+        <p:nvSpPr>
+          <p:cNvPr id="4" name="TextBox 3">
+            <a:extLst>
+              <a:ext uri="{FF2B5EF4-FFF2-40B4-BE49-F238E27FC236}">
+                <a16:creationId xmlns:a16="http://schemas.microsoft.com/office/drawing/2014/main" id="{93577FE8-B86C-40B2-9680-C5C48D0B0199}"/>
+              </a:ext>
+            </a:extLst>
+          </p:cNvPr>
+          <p:cNvSpPr txBox="1"/>
+          <p:nvPr/>
+        </p:nvSpPr>
+        <p:spPr>
+          <a:xfrm>
+            <a:off x="259080" y="457200"/>
+            <a:ext cx="6400800" cy="1877437"/>
+          </a:xfrm>
+          <a:prstGeom prst="rect">
+            <a:avLst/>
+          </a:prstGeom>
+          <a:noFill/>
+        </p:spPr>
+        <p:txBody>
+          <a:bodyPr wrap="square" rtlCol="0">
+            <a:spAutoFit/>
+          </a:bodyPr>
+          <a:lstStyle/>
+          <a:p>
+            <a:pPr marL="400050" indent="-400050">
+              <a:buFont typeface="+mj-lt"/>
+              <a:buAutoNum type="romanUcPeriod" startAt="5"/>
+            </a:pPr>
+            <a:r>
+              <a:rPr lang="en-US" sz="1600" b="1">
+                <a:solidFill>
+                  <a:schemeClr val="bg1"/>
+                </a:solidFill>
+                <a:latin typeface="Arial" panose="020B0604020202020204" pitchFamily="34" charset="0"/>
+                <a:cs typeface="Arial" panose="020B0604020202020204" pitchFamily="34" charset="0"/>
+              </a:rPr>
+              <a:t>Conclusion</a:t>
+            </a:r>
+          </a:p>
+          <a:p>
+            <a:r>
+              <a:rPr lang="en-US" sz="1000">
+                <a:solidFill>
+                  <a:schemeClr val="bg1"/>
+                </a:solidFill>
+                <a:latin typeface="Arial" panose="020B0604020202020204" pitchFamily="34" charset="0"/>
+                <a:cs typeface="Arial" panose="020B0604020202020204" pitchFamily="34" charset="0"/>
+              </a:rPr>
+              <a:t>Based on the mapping data and information provided, the best location to start a new Pet Supply store where there is not already a large number of stores would be in the Pflugerville area along the I-130 corridor to Manor.</a:t>
+            </a:r>
+          </a:p>
+          <a:p>
+            <a:endParaRPr lang="en-US" sz="1000">
+              <a:solidFill>
+                <a:schemeClr val="bg1"/>
+              </a:solidFill>
+              <a:latin typeface="Arial" panose="020B0604020202020204" pitchFamily="34" charset="0"/>
+              <a:cs typeface="Arial" panose="020B0604020202020204" pitchFamily="34" charset="0"/>
+            </a:endParaRPr>
+          </a:p>
+          <a:p>
+            <a:r>
+              <a:rPr lang="en-US" sz="1000">
+                <a:solidFill>
+                  <a:schemeClr val="bg1"/>
+                </a:solidFill>
+                <a:latin typeface="Arial" panose="020B0604020202020204" pitchFamily="34" charset="0"/>
+                <a:cs typeface="Arial" panose="020B0604020202020204" pitchFamily="34" charset="0"/>
+              </a:rPr>
+              <a:t>This is a first-order solution to the question “Where is the best place to open a new pet supply store near Austin, Texas?” Using public datasets, we are able to, at least partially, address a few factors we have mentioned at the beginning: population and existing saturation of pet stores. We also carry out a very simple competitor analysis based on the distribution of pet stores in the chosen Travis and Williamson counties.</a:t>
+            </a:r>
+          </a:p>
+          <a:p>
+            <a:endParaRPr lang="en-US" sz="1000">
+              <a:solidFill>
+                <a:schemeClr val="bg1"/>
+              </a:solidFill>
+              <a:latin typeface="Arial" panose="020B0604020202020204" pitchFamily="34" charset="0"/>
+              <a:cs typeface="Arial" panose="020B0604020202020204" pitchFamily="34" charset="0"/>
+            </a:endParaRPr>
+          </a:p>
+          <a:p>
+            <a:r>
+              <a:rPr lang="en-US" sz="1000">
+                <a:solidFill>
+                  <a:schemeClr val="bg1"/>
+                </a:solidFill>
+                <a:latin typeface="Arial" panose="020B0604020202020204" pitchFamily="34" charset="0"/>
+                <a:cs typeface="Arial" panose="020B0604020202020204" pitchFamily="34" charset="0"/>
+              </a:rPr>
+              <a:t>Further analysis would need to take into consideration cost of opening the store in the locations, along with ease of access to the business at those locations.</a:t>
+            </a:r>
+            <a:endParaRPr lang="en-US" sz="1000" dirty="0">
+              <a:solidFill>
+                <a:schemeClr val="bg1"/>
+              </a:solidFill>
+              <a:latin typeface="Arial" panose="020B0604020202020204" pitchFamily="34" charset="0"/>
+              <a:cs typeface="Arial" panose="020B0604020202020204" pitchFamily="34" charset="0"/>
+            </a:endParaRPr>
+          </a:p>
+        </p:txBody>
+      </p:sp>
+    </p:spTree>
+    <p:extLst>
+      <p:ext uri="{BB962C8B-B14F-4D97-AF65-F5344CB8AC3E}">
+        <p14:creationId xmlns:p14="http://schemas.microsoft.com/office/powerpoint/2010/main" val="2203706787"/>
       </p:ext>
     </p:extLst>
   </p:cSld>

</xml_diff>